<commit_message>
nur ein sternchen eingefügt
</commit_message>
<xml_diff>
--- a/Modbas/Doku/ModBas.pptx
+++ b/Modbas/Doku/ModBas.pptx
@@ -335,7 +335,7 @@
           <a:p>
             <a:fld id="{D338F796-E297-45CA-A62B-51A04DE86EC6}" type="datetimeFigureOut">
               <a:rPr lang="de-DE" smtClean="0"/>
-              <a:t>02.12.2022</a:t>
+              <a:t>03.12.2022</a:t>
             </a:fld>
             <a:endParaRPr lang="de-DE"/>
           </a:p>
@@ -413,7 +413,7 @@
           <a:p>
             <a:fld id="{D7473342-4B16-4649-B223-F22170E43743}" type="slidenum">
               <a:rPr lang="de-DE" smtClean="0"/>
-              <a:t>‹Nr.›</a:t>
+              <a:t>‹#›</a:t>
             </a:fld>
             <a:endParaRPr lang="de-DE"/>
           </a:p>
@@ -512,7 +512,7 @@
           <a:p>
             <a:fld id="{C4F0A1C8-C3E5-453E-B0DF-36BAC2F5290E}" type="datetimeFigureOut">
               <a:rPr lang="de-DE" smtClean="0"/>
-              <a:t>02.12.2022</a:t>
+              <a:t>03.12.2022</a:t>
             </a:fld>
             <a:endParaRPr lang="de-DE" dirty="0"/>
           </a:p>
@@ -670,7 +670,7 @@
           <a:p>
             <a:fld id="{2163F8F1-A50E-4338-81DC-A409571378D0}" type="slidenum">
               <a:rPr lang="de-DE" smtClean="0"/>
-              <a:t>‹Nr.›</a:t>
+              <a:t>‹#›</a:t>
             </a:fld>
             <a:endParaRPr lang="de-DE" dirty="0"/>
           </a:p>
@@ -9684,8 +9684,8 @@
           </a:xfrm>
         </p:spPr>
       </p:pic>
-      <mc:AlternateContent xmlns:mc="http://schemas.openxmlformats.org/markup-compatibility/2006">
-        <mc:Choice xmlns:a14="http://schemas.microsoft.com/office/drawing/2010/main" Requires="a14">
+      <mc:AlternateContent xmlns:mc="http://schemas.openxmlformats.org/markup-compatibility/2006" xmlns:a14="http://schemas.microsoft.com/office/drawing/2010/main">
+        <mc:Choice Requires="a14">
           <p:sp>
             <p:nvSpPr>
               <p:cNvPr id="9" name="Content Placeholder 3">
@@ -10095,7 +10095,7 @@
             </p:txBody>
           </p:sp>
         </mc:Choice>
-        <mc:Fallback>
+        <mc:Fallback xmlns="">
           <p:sp>
             <p:nvSpPr>
               <p:cNvPr id="9" name="Content Placeholder 3">
@@ -16479,8 +16479,8 @@
           </a:p>
         </p:txBody>
       </p:sp>
-      <mc:AlternateContent xmlns:mc="http://schemas.openxmlformats.org/markup-compatibility/2006" xmlns:a14="http://schemas.microsoft.com/office/drawing/2010/main">
-        <mc:Choice Requires="a14">
+      <mc:AlternateContent xmlns:mc="http://schemas.openxmlformats.org/markup-compatibility/2006">
+        <mc:Choice xmlns:a14="http://schemas.microsoft.com/office/drawing/2010/main" Requires="a14">
           <p:sp>
             <p:nvSpPr>
               <p:cNvPr id="3" name="Content Placeholder 2">
@@ -16500,7 +16500,7 @@
             <p:spPr>
               <a:xfrm>
                 <a:off x="0" y="714826"/>
-                <a:ext cx="6528000" cy="5713998"/>
+                <a:ext cx="6816000" cy="5713998"/>
               </a:xfrm>
             </p:spPr>
             <p:txBody>
@@ -16895,14 +16895,14 @@
                 </a:r>
                 <a14:m>
                   <m:oMath xmlns:m="http://schemas.openxmlformats.org/officeDocument/2006/math">
-                    <m:sSub>
-                      <m:sSubPr>
+                    <m:sSubSup>
+                      <m:sSubSupPr>
                         <m:ctrlPr>
                           <a:rPr lang="de-DE" b="0" i="1" smtClean="0">
                             <a:latin typeface="Cambria Math" panose="02040503050406030204" pitchFamily="18" charset="0"/>
                           </a:rPr>
                         </m:ctrlPr>
-                      </m:sSubPr>
+                      </m:sSubSupPr>
                       <m:e>
                         <m:r>
                           <a:rPr lang="de-DE" b="0" i="1" smtClean="0">
@@ -16925,7 +16925,15 @@
                           <m:t>1</m:t>
                         </m:r>
                       </m:sub>
-                    </m:sSub>
+                      <m:sup>
+                        <m:r>
+                          <a:rPr lang="de-DE" b="0" i="1" smtClean="0">
+                            <a:latin typeface="Cambria Math" panose="02040503050406030204" pitchFamily="18" charset="0"/>
+                          </a:rPr>
+                          <m:t>∗</m:t>
+                        </m:r>
+                      </m:sup>
+                    </m:sSubSup>
                     <m:d>
                       <m:dPr>
                         <m:ctrlPr>
@@ -16939,7 +16947,7 @@
                           <a:rPr lang="de-DE" b="0" i="1" smtClean="0">
                             <a:latin typeface="Cambria Math" panose="02040503050406030204" pitchFamily="18" charset="0"/>
                           </a:rPr>
-                          <m:t>𝑠</m:t>
+                          <m:t>𝑧</m:t>
                         </m:r>
                       </m:e>
                     </m:d>
@@ -17222,7 +17230,7 @@
                 <a:endParaRPr lang="de-DE" b="0" dirty="0"/>
               </a:p>
               <a:p>
-                <a:pPr lvl="1"/>
+                <a:pPr lvl="2"/>
                 <a14:m>
                   <m:oMath xmlns:m="http://schemas.openxmlformats.org/officeDocument/2006/math">
                     <m:r>
@@ -17650,7 +17658,7 @@
                 <a:endParaRPr lang="de-DE" b="0" dirty="0"/>
               </a:p>
               <a:p>
-                <a:pPr lvl="1"/>
+                <a:pPr lvl="2"/>
                 <a14:m>
                   <m:oMath xmlns:m="http://schemas.openxmlformats.org/officeDocument/2006/math">
                     <m:d>
@@ -17742,6 +17750,37 @@
                         <a:latin typeface="Cambria Math" panose="02040503050406030204" pitchFamily="18" charset="0"/>
                       </a:rPr>
                       <m:t>=(</m:t>
+                    </m:r>
+                    <m:sSub>
+                      <m:sSubPr>
+                        <m:ctrlPr>
+                          <a:rPr lang="de-DE" b="0" i="1" smtClean="0">
+                            <a:latin typeface="Cambria Math" panose="02040503050406030204" pitchFamily="18" charset="0"/>
+                          </a:rPr>
+                        </m:ctrlPr>
+                      </m:sSubPr>
+                      <m:e>
+                        <m:r>
+                          <a:rPr lang="de-DE" b="0" i="1" smtClean="0">
+                            <a:latin typeface="Cambria Math" panose="02040503050406030204" pitchFamily="18" charset="0"/>
+                          </a:rPr>
+                          <m:t>𝑇</m:t>
+                        </m:r>
+                      </m:e>
+                      <m:sub>
+                        <m:r>
+                          <a:rPr lang="de-DE" b="0" i="1" smtClean="0">
+                            <a:latin typeface="Cambria Math" panose="02040503050406030204" pitchFamily="18" charset="0"/>
+                          </a:rPr>
+                          <m:t>𝐴</m:t>
+                        </m:r>
+                      </m:sub>
+                    </m:sSub>
+                    <m:r>
+                      <a:rPr lang="de-DE" b="0" i="1" smtClean="0">
+                        <a:latin typeface="Cambria Math" panose="02040503050406030204" pitchFamily="18" charset="0"/>
+                      </a:rPr>
+                      <m:t>+</m:t>
                     </m:r>
                     <m:r>
                       <a:rPr lang="de-DE" i="1">
@@ -17771,37 +17810,6 @@
                             <a:latin typeface="Cambria Math" panose="02040503050406030204" pitchFamily="18" charset="0"/>
                           </a:rPr>
                           <m:t>𝑖</m:t>
-                        </m:r>
-                      </m:sub>
-                    </m:sSub>
-                    <m:r>
-                      <a:rPr lang="de-DE" i="1">
-                        <a:latin typeface="Cambria Math" panose="02040503050406030204" pitchFamily="18" charset="0"/>
-                      </a:rPr>
-                      <m:t>+</m:t>
-                    </m:r>
-                    <m:sSub>
-                      <m:sSubPr>
-                        <m:ctrlPr>
-                          <a:rPr lang="de-DE" i="1">
-                            <a:latin typeface="Cambria Math" panose="02040503050406030204" pitchFamily="18" charset="0"/>
-                          </a:rPr>
-                        </m:ctrlPr>
-                      </m:sSubPr>
-                      <m:e>
-                        <m:r>
-                          <a:rPr lang="de-DE" i="1">
-                            <a:latin typeface="Cambria Math" panose="02040503050406030204" pitchFamily="18" charset="0"/>
-                          </a:rPr>
-                          <m:t>𝑇</m:t>
-                        </m:r>
-                      </m:e>
-                      <m:sub>
-                        <m:r>
-                          <a:rPr lang="de-DE" i="1">
-                            <a:latin typeface="Cambria Math" panose="02040503050406030204" pitchFamily="18" charset="0"/>
-                          </a:rPr>
-                          <m:t>𝐴</m:t>
                         </m:r>
                       </m:sub>
                     </m:sSub>
@@ -17964,6 +17972,14 @@
               </a:p>
               <a:p>
                 <a:pPr lvl="1"/>
+                <a:r>
+                  <a:rPr lang="de-DE" dirty="0"/>
+                  <a:t>Rücktransformation</a:t>
+                </a:r>
+                <a:endParaRPr lang="de-DE" b="0" dirty="0"/>
+              </a:p>
+              <a:p>
+                <a:pPr lvl="2"/>
                 <a14:m>
                   <m:oMath xmlns:m="http://schemas.openxmlformats.org/officeDocument/2006/math">
                     <m:r>
@@ -18049,12 +18065,6 @@
                         </m:ctrlPr>
                       </m:dPr>
                       <m:e>
-                        <m:r>
-                          <a:rPr lang="de-DE" b="0" i="1" smtClean="0">
-                            <a:latin typeface="Cambria Math" panose="02040503050406030204" pitchFamily="18" charset="0"/>
-                          </a:rPr>
-                          <m:t>2</m:t>
-                        </m:r>
                         <m:sSub>
                           <m:sSubPr>
                             <m:ctrlPr>
@@ -18076,7 +18086,7 @@
                               <a:rPr lang="de-DE" b="0" i="1" smtClean="0">
                                 <a:latin typeface="Cambria Math" panose="02040503050406030204" pitchFamily="18" charset="0"/>
                               </a:rPr>
-                              <m:t>𝑖</m:t>
+                              <m:t>𝐴</m:t>
                             </m:r>
                           </m:sub>
                         </m:sSub>
@@ -18085,6 +18095,12 @@
                             <a:latin typeface="Cambria Math" panose="02040503050406030204" pitchFamily="18" charset="0"/>
                           </a:rPr>
                           <m:t>+</m:t>
+                        </m:r>
+                        <m:r>
+                          <a:rPr lang="de-DE" b="0" i="1" smtClean="0">
+                            <a:latin typeface="Cambria Math" panose="02040503050406030204" pitchFamily="18" charset="0"/>
+                          </a:rPr>
+                          <m:t>2</m:t>
                         </m:r>
                         <m:sSub>
                           <m:sSubPr>
@@ -18107,7 +18123,7 @@
                               <a:rPr lang="de-DE" b="0" i="1" smtClean="0">
                                 <a:latin typeface="Cambria Math" panose="02040503050406030204" pitchFamily="18" charset="0"/>
                               </a:rPr>
-                              <m:t>𝐴</m:t>
+                              <m:t>𝑖</m:t>
                             </m:r>
                           </m:sub>
                         </m:sSub>
@@ -18277,7 +18293,7 @@
                 <a:endParaRPr lang="de-DE" b="0" dirty="0"/>
               </a:p>
               <a:p>
-                <a:pPr lvl="1"/>
+                <a:pPr lvl="2"/>
                 <a14:m>
                   <m:oMath xmlns:m="http://schemas.openxmlformats.org/officeDocument/2006/math">
                     <m:sSub>
@@ -18311,6 +18327,43 @@
                       </a:rPr>
                       <m:t>=</m:t>
                     </m:r>
+                    <m:sSub>
+                      <m:sSubPr>
+                        <m:ctrlPr>
+                          <a:rPr lang="de-DE" i="1">
+                            <a:latin typeface="Cambria Math" panose="02040503050406030204" pitchFamily="18" charset="0"/>
+                          </a:rPr>
+                        </m:ctrlPr>
+                      </m:sSubPr>
+                      <m:e>
+                        <m:r>
+                          <a:rPr lang="de-DE" i="1">
+                            <a:latin typeface="Cambria Math" panose="02040503050406030204" pitchFamily="18" charset="0"/>
+                          </a:rPr>
+                          <m:t>𝑢</m:t>
+                        </m:r>
+                      </m:e>
+                      <m:sub>
+                        <m:r>
+                          <a:rPr lang="de-DE" i="1">
+                            <a:latin typeface="Cambria Math" panose="02040503050406030204" pitchFamily="18" charset="0"/>
+                          </a:rPr>
+                          <m:t>𝑉𝑝𝑘</m:t>
+                        </m:r>
+                        <m:r>
+                          <a:rPr lang="de-DE" i="1">
+                            <a:latin typeface="Cambria Math" panose="02040503050406030204" pitchFamily="18" charset="0"/>
+                          </a:rPr>
+                          <m:t>−1</m:t>
+                        </m:r>
+                      </m:sub>
+                    </m:sSub>
+                    <m:r>
+                      <a:rPr lang="de-DE" b="0" i="1" smtClean="0">
+                        <a:latin typeface="Cambria Math" panose="02040503050406030204" pitchFamily="18" charset="0"/>
+                      </a:rPr>
+                      <m:t>+</m:t>
+                    </m:r>
                     <m:f>
                       <m:fPr>
                         <m:ctrlPr>
@@ -18320,23 +18373,17 @@
                         </m:ctrlPr>
                       </m:fPr>
                       <m:num>
-                        <m:r>
-                          <a:rPr lang="de-DE" i="1">
-                            <a:latin typeface="Cambria Math" panose="02040503050406030204" pitchFamily="18" charset="0"/>
-                          </a:rPr>
-                          <m:t>2</m:t>
-                        </m:r>
                         <m:sSub>
                           <m:sSubPr>
                             <m:ctrlPr>
-                              <a:rPr lang="de-DE" i="1">
+                              <a:rPr lang="de-DE" b="0" i="1" smtClean="0">
                                 <a:latin typeface="Cambria Math" panose="02040503050406030204" pitchFamily="18" charset="0"/>
                               </a:rPr>
                             </m:ctrlPr>
                           </m:sSubPr>
                           <m:e>
                             <m:r>
-                              <a:rPr lang="de-DE" i="1">
+                              <a:rPr lang="de-DE" b="0" i="1" smtClean="0">
                                 <a:latin typeface="Cambria Math" panose="02040503050406030204" pitchFamily="18" charset="0"/>
                               </a:rPr>
                               <m:t>𝑇</m:t>
@@ -18344,18 +18391,24 @@
                           </m:e>
                           <m:sub>
                             <m:r>
-                              <a:rPr lang="de-DE" i="1">
-                                <a:latin typeface="Cambria Math" panose="02040503050406030204" pitchFamily="18" charset="0"/>
-                              </a:rPr>
-                              <m:t>𝑖</m:t>
+                              <a:rPr lang="de-DE" b="0" i="1" smtClean="0">
+                                <a:latin typeface="Cambria Math" panose="02040503050406030204" pitchFamily="18" charset="0"/>
+                              </a:rPr>
+                              <m:t>𝐴</m:t>
                             </m:r>
                           </m:sub>
                         </m:sSub>
                         <m:r>
+                          <a:rPr lang="de-DE" b="0" i="1" smtClean="0">
+                            <a:latin typeface="Cambria Math" panose="02040503050406030204" pitchFamily="18" charset="0"/>
+                          </a:rPr>
+                          <m:t>+</m:t>
+                        </m:r>
+                        <m:r>
                           <a:rPr lang="de-DE" i="1">
                             <a:latin typeface="Cambria Math" panose="02040503050406030204" pitchFamily="18" charset="0"/>
                           </a:rPr>
-                          <m:t>+</m:t>
+                          <m:t>2</m:t>
                         </m:r>
                         <m:sSub>
                           <m:sSubPr>
@@ -18378,7 +18431,7 @@
                               <a:rPr lang="de-DE" i="1">
                                 <a:latin typeface="Cambria Math" panose="02040503050406030204" pitchFamily="18" charset="0"/>
                               </a:rPr>
-                              <m:t>𝐴</m:t>
+                              <m:t>𝑖</m:t>
                             </m:r>
                           </m:sub>
                         </m:sSub>
@@ -18544,43 +18597,6 @@
                             <a:latin typeface="Cambria Math" panose="02040503050406030204" pitchFamily="18" charset="0"/>
                           </a:rPr>
                           <m:t>𝑘</m:t>
-                        </m:r>
-                        <m:r>
-                          <a:rPr lang="de-DE" i="1">
-                            <a:latin typeface="Cambria Math" panose="02040503050406030204" pitchFamily="18" charset="0"/>
-                          </a:rPr>
-                          <m:t>−1</m:t>
-                        </m:r>
-                      </m:sub>
-                    </m:sSub>
-                    <m:r>
-                      <a:rPr lang="de-DE" b="0" i="1" smtClean="0">
-                        <a:latin typeface="Cambria Math" panose="02040503050406030204" pitchFamily="18" charset="0"/>
-                      </a:rPr>
-                      <m:t>+</m:t>
-                    </m:r>
-                    <m:sSub>
-                      <m:sSubPr>
-                        <m:ctrlPr>
-                          <a:rPr lang="de-DE" i="1">
-                            <a:latin typeface="Cambria Math" panose="02040503050406030204" pitchFamily="18" charset="0"/>
-                          </a:rPr>
-                        </m:ctrlPr>
-                      </m:sSubPr>
-                      <m:e>
-                        <m:r>
-                          <a:rPr lang="de-DE" i="1">
-                            <a:latin typeface="Cambria Math" panose="02040503050406030204" pitchFamily="18" charset="0"/>
-                          </a:rPr>
-                          <m:t>𝑢</m:t>
-                        </m:r>
-                      </m:e>
-                      <m:sub>
-                        <m:r>
-                          <a:rPr lang="de-DE" i="1">
-                            <a:latin typeface="Cambria Math" panose="02040503050406030204" pitchFamily="18" charset="0"/>
-                          </a:rPr>
-                          <m:t>𝑉𝑝𝑘</m:t>
                         </m:r>
                         <m:r>
                           <a:rPr lang="de-DE" i="1">
@@ -18621,7 +18637,7 @@
             </p:txBody>
           </p:sp>
         </mc:Choice>
-        <mc:Fallback xmlns="">
+        <mc:Fallback>
           <p:sp>
             <p:nvSpPr>
               <p:cNvPr id="3" name="Content Placeholder 2">
@@ -18641,12 +18657,12 @@
             <p:spPr>
               <a:xfrm>
                 <a:off x="0" y="714826"/>
-                <a:ext cx="6528000" cy="5713998"/>
+                <a:ext cx="6816000" cy="5713998"/>
               </a:xfrm>
               <a:blipFill>
                 <a:blip r:embed="rId2"/>
                 <a:stretch>
-                  <a:fillRect l="-560" t="-959"/>
+                  <a:fillRect l="-537" t="-959"/>
                 </a:stretch>
               </a:blipFill>
             </p:spPr>

</xml_diff>